<commit_message>
Updated Presentation with @J's Slides
</commit_message>
<xml_diff>
--- a/NiceTours Presentation.pptx
+++ b/NiceTours Presentation.pptx
@@ -5,14 +5,20 @@
     <p:sldMasterId id="2147483660" r:id="rId1"/>
   </p:sldMasterIdLst>
   <p:notesMasterIdLst>
-    <p:notesMasterId r:id="rId4"/>
+    <p:notesMasterId r:id="rId10"/>
   </p:notesMasterIdLst>
   <p:handoutMasterIdLst>
-    <p:handoutMasterId r:id="rId5"/>
+    <p:handoutMasterId r:id="rId11"/>
   </p:handoutMasterIdLst>
   <p:sldIdLst>
     <p:sldId id="256" r:id="rId2"/>
     <p:sldId id="257" r:id="rId3"/>
+    <p:sldId id="260" r:id="rId4"/>
+    <p:sldId id="261" r:id="rId5"/>
+    <p:sldId id="262" r:id="rId6"/>
+    <p:sldId id="263" r:id="rId7"/>
+    <p:sldId id="264" r:id="rId8"/>
+    <p:sldId id="265" r:id="rId9"/>
   </p:sldIdLst>
   <p:sldSz cx="9144000" cy="6858000" type="screen4x3"/>
   <p:notesSz cx="6858000" cy="9144000"/>
@@ -126,6 +132,9 @@
         </p15:guide>
       </p15:sldGuideLst>
     </p:ext>
+    <p:ext uri="{2D200454-40CA-4A62-9FC3-DE9A4176ACB9}">
+      <p15:notesGuideLst xmlns:p15="http://schemas.microsoft.com/office/powerpoint/2012/main"/>
+    </p:ext>
   </p:extLst>
 </p:presentation>
 </file>
@@ -228,7 +237,7 @@
           <a:p>
             <a:fld id="{B3FE9A77-5233-44B6-B2DF-3DE81FC1C5A5}" type="datetimeFigureOut">
               <a:rPr lang="de-DE" smtClean="0"/>
-              <a:t>25.01.2018</a:t>
+              <a:t>28.01.2018</a:t>
             </a:fld>
             <a:endParaRPr lang="de-DE"/>
           </a:p>
@@ -405,7 +414,7 @@
           <a:p>
             <a:fld id="{B501DE9F-D5AE-4655-A45C-963C1409FDCA}" type="datetimeFigureOut">
               <a:rPr lang="de-DE" smtClean="0"/>
-              <a:t>25.01.2018</a:t>
+              <a:t>28.01.2018</a:t>
             </a:fld>
             <a:endParaRPr lang="de-DE"/>
           </a:p>
@@ -3915,14 +3924,14 @@
             </a:gs>
             <a:gs pos="83000">
               <a:schemeClr val="accent6">
-                <a:lumMod val="20000"/>
-                <a:lumOff val="80000"/>
+                <a:lumMod val="16000"/>
+                <a:lumOff val="84000"/>
               </a:schemeClr>
             </a:gs>
             <a:gs pos="100000">
               <a:schemeClr val="accent6">
-                <a:lumMod val="20000"/>
-                <a:lumOff val="80000"/>
+                <a:lumMod val="16000"/>
+                <a:lumOff val="84000"/>
               </a:schemeClr>
             </a:gs>
           </a:gsLst>
@@ -3969,54 +3978,54 @@
         </p:spPr>
         <p:txBody>
           <a:bodyPr>
-            <a:normAutofit fontScale="90000"/>
+            <a:noAutofit/>
           </a:bodyPr>
           <a:lstStyle/>
           <a:p>
             <a:r>
-              <a:rPr lang="de-DE" b="1" dirty="0" err="1"/>
+              <a:rPr lang="de-DE" sz="4400" b="1" dirty="0" err="1"/>
               <a:t>NiceTours</a:t>
             </a:r>
             <a:br>
-              <a:rPr lang="de-DE" b="1" dirty="0"/>
+              <a:rPr lang="de-DE" sz="4400" b="1" dirty="0"/>
             </a:br>
             <a:br>
-              <a:rPr lang="de-DE" b="1" dirty="0"/>
+              <a:rPr lang="de-DE" sz="4400" b="1" dirty="0"/>
             </a:br>
             <a:br>
-              <a:rPr lang="de-DE" b="1" dirty="0"/>
+              <a:rPr lang="de-DE" sz="4400" b="1" dirty="0"/>
             </a:br>
             <a:br>
-              <a:rPr lang="de-DE" b="1" dirty="0"/>
+              <a:rPr lang="de-DE" sz="4400" b="1" dirty="0"/>
             </a:br>
             <a:br>
-              <a:rPr lang="de-DE" b="1" dirty="0"/>
+              <a:rPr lang="de-DE" sz="4400" b="1" dirty="0"/>
             </a:br>
             <a:br>
-              <a:rPr lang="de-DE" dirty="0"/>
+              <a:rPr lang="de-DE" sz="4400" dirty="0"/>
             </a:br>
             <a:r>
-              <a:rPr lang="de-DE" sz="2700" dirty="0"/>
+              <a:rPr lang="de-DE" sz="2800" dirty="0"/>
               <a:t>Mobile Interaction Design – WS 2017/18</a:t>
             </a:r>
             <a:br>
-              <a:rPr lang="de-DE" sz="2700" dirty="0"/>
+              <a:rPr lang="de-DE" sz="2800" dirty="0"/>
             </a:br>
             <a:r>
-              <a:rPr lang="de-DE" sz="2700" dirty="0"/>
+              <a:rPr lang="de-DE" sz="2800" dirty="0"/>
               <a:t>Gruppe 2</a:t>
             </a:r>
             <a:br>
-              <a:rPr lang="de-DE" sz="2700" dirty="0"/>
+              <a:rPr lang="de-DE" sz="2800" dirty="0"/>
             </a:br>
             <a:br>
-              <a:rPr lang="de-DE" sz="2700" dirty="0"/>
+              <a:rPr lang="de-DE" sz="2800" dirty="0"/>
             </a:br>
             <a:r>
-              <a:rPr lang="de-DE" sz="2700" i="1" dirty="0"/>
+              <a:rPr lang="de-DE" sz="2800" i="1" dirty="0"/>
               <a:t>01.02.2018</a:t>
             </a:r>
-            <a:endParaRPr lang="de-DE" i="1" dirty="0"/>
+            <a:endParaRPr lang="de-DE" sz="4400" i="1" dirty="0"/>
           </a:p>
         </p:txBody>
       </p:sp>
@@ -4048,7 +4057,7 @@
         </p:blipFill>
         <p:spPr>
           <a:xfrm>
-            <a:off x="3657600" y="2348880"/>
+            <a:off x="3657600" y="2204864"/>
             <a:ext cx="1828800" cy="1828800"/>
           </a:xfrm>
           <a:prstGeom prst="rect">
@@ -4104,53 +4113,80 @@
         </p:nvSpPr>
         <p:spPr>
           <a:xfrm>
-            <a:off x="628651" y="188640"/>
-            <a:ext cx="5743550" cy="709961"/>
+            <a:off x="539552" y="231551"/>
+            <a:ext cx="5916364" cy="862335"/>
           </a:xfrm>
         </p:spPr>
         <p:txBody>
+          <a:bodyPr>
+            <a:normAutofit/>
+          </a:bodyPr>
+          <a:lstStyle/>
+          <a:p>
+            <a:r>
+              <a:rPr lang="de-DE" sz="3600" dirty="0"/>
+              <a:t>Vision</a:t>
+            </a:r>
+          </a:p>
+        </p:txBody>
+      </p:sp>
+      <p:sp>
+        <p:nvSpPr>
+          <p:cNvPr id="27" name="Fußzeilenplatzhalter 26">
+            <a:extLst>
+              <a:ext uri="{FF2B5EF4-FFF2-40B4-BE49-F238E27FC236}">
+                <a16:creationId xmlns:a16="http://schemas.microsoft.com/office/drawing/2014/main" id="{3976722D-E43A-48F2-811E-4F12ED62840C}"/>
+              </a:ext>
+            </a:extLst>
+          </p:cNvPr>
+          <p:cNvSpPr>
+            <a:spLocks noGrp="1"/>
+          </p:cNvSpPr>
+          <p:nvPr>
+            <p:ph type="ftr" sz="quarter" idx="11"/>
+          </p:nvPr>
+        </p:nvSpPr>
+        <p:spPr/>
+        <p:txBody>
           <a:bodyPr/>
           <a:lstStyle/>
           <a:p>
-            <a:endParaRPr lang="de-DE" dirty="0"/>
-          </a:p>
-        </p:txBody>
-      </p:sp>
-      <p:pic>
-        <p:nvPicPr>
-          <p:cNvPr id="17" name="Inhaltsplatzhalter 16">
-            <a:extLst>
-              <a:ext uri="{FF2B5EF4-FFF2-40B4-BE49-F238E27FC236}">
-                <a16:creationId xmlns:a16="http://schemas.microsoft.com/office/drawing/2014/main" id="{2C7434AB-9843-4BFE-87E2-CBEDED9E0606}"/>
-              </a:ext>
-            </a:extLst>
-          </p:cNvPr>
-          <p:cNvPicPr>
-            <a:picLocks noGrp="1" noChangeAspect="1"/>
-          </p:cNvPicPr>
-          <p:nvPr>
-            <p:ph idx="1"/>
-          </p:nvPr>
-        </p:nvPicPr>
-        <p:blipFill>
-          <a:blip r:embed="rId2" cstate="print">
-            <a:extLst>
-              <a:ext uri="{28A0092B-C50C-407E-A947-70E740481C1C}">
-                <a14:useLocalDpi xmlns:a14="http://schemas.microsoft.com/office/drawing/2010/main" val="0"/>
-              </a:ext>
-            </a:extLst>
-          </a:blip>
-          <a:stretch>
-            <a:fillRect/>
-          </a:stretch>
-        </p:blipFill>
-        <p:spPr>
-          <a:xfrm>
-            <a:off x="6493983" y="128625"/>
-            <a:ext cx="2654283" cy="829990"/>
-          </a:xfrm>
-        </p:spPr>
-      </p:pic>
+            <a:r>
+              <a:rPr lang="de-DE" dirty="0"/>
+              <a:t>Mobile Interaction Design - WS 17/18</a:t>
+            </a:r>
+          </a:p>
+        </p:txBody>
+      </p:sp>
+      <p:sp>
+        <p:nvSpPr>
+          <p:cNvPr id="28" name="Foliennummernplatzhalter 27">
+            <a:extLst>
+              <a:ext uri="{FF2B5EF4-FFF2-40B4-BE49-F238E27FC236}">
+                <a16:creationId xmlns:a16="http://schemas.microsoft.com/office/drawing/2014/main" id="{4A07CAB0-8524-4600-A2A2-63EF77B6DF10}"/>
+              </a:ext>
+            </a:extLst>
+          </p:cNvPr>
+          <p:cNvSpPr>
+            <a:spLocks noGrp="1"/>
+          </p:cNvSpPr>
+          <p:nvPr>
+            <p:ph type="sldNum" sz="quarter" idx="12"/>
+          </p:nvPr>
+        </p:nvSpPr>
+        <p:spPr/>
+        <p:txBody>
+          <a:bodyPr/>
+          <a:lstStyle/>
+          <a:p>
+            <a:fld id="{6C6AE60A-B69C-4790-82F7-3882EDF23186}" type="slidenum">
+              <a:rPr lang="de-DE" smtClean="0"/>
+              <a:t>2</a:t>
+            </a:fld>
+            <a:endParaRPr lang="de-DE"/>
+          </a:p>
+        </p:txBody>
+      </p:sp>
       <p:pic>
         <p:nvPicPr>
           <p:cNvPr id="19" name="Grafik 18">
@@ -4166,7 +4202,7 @@
           <p:nvPr/>
         </p:nvPicPr>
         <p:blipFill>
-          <a:blip r:embed="rId3" cstate="print">
+          <a:blip r:embed="rId2" cstate="print">
             <a:extLst>
               <a:ext uri="{28A0092B-C50C-407E-A947-70E740481C1C}">
                 <a14:useLocalDpi xmlns:a14="http://schemas.microsoft.com/office/drawing/2010/main" val="0"/>
@@ -4189,65 +4225,1593 @@
       </p:pic>
       <p:sp>
         <p:nvSpPr>
-          <p:cNvPr id="27" name="Fußzeilenplatzhalter 26">
-            <a:extLst>
-              <a:ext uri="{FF2B5EF4-FFF2-40B4-BE49-F238E27FC236}">
-                <a16:creationId xmlns:a16="http://schemas.microsoft.com/office/drawing/2014/main" id="{3976722D-E43A-48F2-811E-4F12ED62840C}"/>
-              </a:ext>
-            </a:extLst>
-          </p:cNvPr>
-          <p:cNvSpPr>
-            <a:spLocks noGrp="1"/>
-          </p:cNvSpPr>
-          <p:nvPr>
-            <p:ph type="ftr" sz="quarter" idx="11"/>
-          </p:nvPr>
-        </p:nvSpPr>
-        <p:spPr/>
-        <p:txBody>
-          <a:bodyPr/>
-          <a:lstStyle/>
-          <a:p>
-            <a:r>
-              <a:rPr lang="de-DE" dirty="0"/>
-              <a:t>Mobile Interaction Design - WS 17/18</a:t>
-            </a:r>
-          </a:p>
-        </p:txBody>
-      </p:sp>
-      <p:sp>
-        <p:nvSpPr>
-          <p:cNvPr id="28" name="Foliennummernplatzhalter 27">
-            <a:extLst>
-              <a:ext uri="{FF2B5EF4-FFF2-40B4-BE49-F238E27FC236}">
-                <a16:creationId xmlns:a16="http://schemas.microsoft.com/office/drawing/2014/main" id="{4A07CAB0-8524-4600-A2A2-63EF77B6DF10}"/>
-              </a:ext>
-            </a:extLst>
-          </p:cNvPr>
-          <p:cNvSpPr>
-            <a:spLocks noGrp="1"/>
-          </p:cNvSpPr>
-          <p:nvPr>
-            <p:ph type="sldNum" sz="quarter" idx="12"/>
-          </p:nvPr>
-        </p:nvSpPr>
-        <p:spPr/>
-        <p:txBody>
-          <a:bodyPr/>
-          <a:lstStyle/>
-          <a:p>
-            <a:fld id="{6C6AE60A-B69C-4790-82F7-3882EDF23186}" type="slidenum">
-              <a:rPr lang="de-DE" smtClean="0"/>
-              <a:t>2</a:t>
-            </a:fld>
-            <a:endParaRPr lang="de-DE"/>
-          </a:p>
-        </p:txBody>
-      </p:sp>
+          <p:cNvPr id="4" name="Inhaltsplatzhalter 3">
+            <a:extLst>
+              <a:ext uri="{FF2B5EF4-FFF2-40B4-BE49-F238E27FC236}">
+                <a16:creationId xmlns:a16="http://schemas.microsoft.com/office/drawing/2014/main" id="{8BDF04EC-34E3-4086-87DA-0491BD37874E}"/>
+              </a:ext>
+            </a:extLst>
+          </p:cNvPr>
+          <p:cNvSpPr>
+            <a:spLocks noGrp="1"/>
+          </p:cNvSpPr>
+          <p:nvPr>
+            <p:ph idx="1"/>
+          </p:nvPr>
+        </p:nvSpPr>
+        <p:spPr>
+          <a:xfrm>
+            <a:off x="539552" y="1342110"/>
+            <a:ext cx="7975798" cy="4436061"/>
+          </a:xfrm>
+        </p:spPr>
+        <p:txBody>
+          <a:bodyPr>
+            <a:normAutofit/>
+          </a:bodyPr>
+          <a:lstStyle/>
+          <a:p>
+            <a:r>
+              <a:rPr lang="de-DE" sz="2800" dirty="0"/>
+              <a:t>Fremde Orte in einer </a:t>
+            </a:r>
+            <a:r>
+              <a:rPr lang="de-DE" sz="2800" b="1" dirty="0"/>
+              <a:t>Sightseeing Tour </a:t>
+            </a:r>
+            <a:r>
+              <a:rPr lang="de-DE" sz="2800" dirty="0"/>
+              <a:t>entdecken</a:t>
+            </a:r>
+          </a:p>
+          <a:p>
+            <a:endParaRPr lang="de-DE" sz="2800" b="1" dirty="0"/>
+          </a:p>
+          <a:p>
+            <a:r>
+              <a:rPr lang="de-DE" sz="2800" dirty="0"/>
+              <a:t>Navigation basierend auf Smartphone/-watch Technologie</a:t>
+            </a:r>
+          </a:p>
+          <a:p>
+            <a:endParaRPr lang="de-DE" sz="2800" dirty="0"/>
+          </a:p>
+          <a:p>
+            <a:r>
+              <a:rPr lang="de-DE" sz="2800" dirty="0"/>
+              <a:t>Präferierte Sehenswürdigkeiten auswählen</a:t>
+            </a:r>
+          </a:p>
+          <a:p>
+            <a:endParaRPr lang="de-DE" sz="2800" dirty="0"/>
+          </a:p>
+          <a:p>
+            <a:r>
+              <a:rPr lang="de-DE" sz="2800" dirty="0"/>
+              <a:t>Zeitplanung möglich</a:t>
+            </a:r>
+          </a:p>
+        </p:txBody>
+      </p:sp>
+      <p:pic>
+        <p:nvPicPr>
+          <p:cNvPr id="9" name="Inhaltsplatzhalter 16">
+            <a:extLst>
+              <a:ext uri="{FF2B5EF4-FFF2-40B4-BE49-F238E27FC236}">
+                <a16:creationId xmlns:a16="http://schemas.microsoft.com/office/drawing/2014/main" id="{388F0AE5-25B0-4978-83EC-63475B7B83C2}"/>
+              </a:ext>
+            </a:extLst>
+          </p:cNvPr>
+          <p:cNvPicPr>
+            <a:picLocks noChangeAspect="1"/>
+          </p:cNvPicPr>
+          <p:nvPr/>
+        </p:nvPicPr>
+        <p:blipFill>
+          <a:blip r:embed="rId3" cstate="print">
+            <a:extLst>
+              <a:ext uri="{28A0092B-C50C-407E-A947-70E740481C1C}">
+                <a14:useLocalDpi xmlns:a14="http://schemas.microsoft.com/office/drawing/2010/main" val="0"/>
+              </a:ext>
+            </a:extLst>
+          </a:blip>
+          <a:stretch>
+            <a:fillRect/>
+          </a:stretch>
+        </p:blipFill>
+        <p:spPr>
+          <a:xfrm>
+            <a:off x="6455916" y="247081"/>
+            <a:ext cx="2655916" cy="831273"/>
+          </a:xfrm>
+          <a:prstGeom prst="rect">
+            <a:avLst/>
+          </a:prstGeom>
+        </p:spPr>
+      </p:pic>
     </p:spTree>
     <p:extLst>
       <p:ext uri="{BB962C8B-B14F-4D97-AF65-F5344CB8AC3E}">
         <p14:creationId xmlns:p14="http://schemas.microsoft.com/office/powerpoint/2010/main" val="2119977467"/>
+      </p:ext>
+    </p:extLst>
+  </p:cSld>
+  <p:clrMapOvr>
+    <a:masterClrMapping/>
+  </p:clrMapOvr>
+</p:sld>
+</file>
+
+<file path=ppt/slides/slide3.xml><?xml version="1.0" encoding="utf-8"?>
+<p:sld xmlns:a="http://schemas.openxmlformats.org/drawingml/2006/main" xmlns:r="http://schemas.openxmlformats.org/officeDocument/2006/relationships" xmlns:p="http://schemas.openxmlformats.org/presentationml/2006/main">
+  <p:cSld>
+    <p:spTree>
+      <p:nvGrpSpPr>
+        <p:cNvPr id="1" name=""/>
+        <p:cNvGrpSpPr/>
+        <p:nvPr/>
+      </p:nvGrpSpPr>
+      <p:grpSpPr>
+        <a:xfrm>
+          <a:off x="0" y="0"/>
+          <a:ext cx="0" cy="0"/>
+          <a:chOff x="0" y="0"/>
+          <a:chExt cx="0" cy="0"/>
+        </a:xfrm>
+      </p:grpSpPr>
+      <p:sp>
+        <p:nvSpPr>
+          <p:cNvPr id="2" name="Titel 1">
+            <a:extLst>
+              <a:ext uri="{FF2B5EF4-FFF2-40B4-BE49-F238E27FC236}">
+                <a16:creationId xmlns:a16="http://schemas.microsoft.com/office/drawing/2014/main" id="{4AC2AF5F-D4DB-4BFF-8690-FA5AEF7E6294}"/>
+              </a:ext>
+            </a:extLst>
+          </p:cNvPr>
+          <p:cNvSpPr>
+            <a:spLocks noGrp="1"/>
+          </p:cNvSpPr>
+          <p:nvPr>
+            <p:ph type="title"/>
+          </p:nvPr>
+        </p:nvSpPr>
+        <p:spPr>
+          <a:xfrm>
+            <a:off x="539552" y="231551"/>
+            <a:ext cx="5916364" cy="862335"/>
+          </a:xfrm>
+        </p:spPr>
+        <p:txBody>
+          <a:bodyPr>
+            <a:normAutofit/>
+          </a:bodyPr>
+          <a:lstStyle/>
+          <a:p>
+            <a:r>
+              <a:rPr lang="de-DE" sz="3600" dirty="0"/>
+              <a:t>Zielgruppe</a:t>
+            </a:r>
+          </a:p>
+        </p:txBody>
+      </p:sp>
+      <p:sp>
+        <p:nvSpPr>
+          <p:cNvPr id="27" name="Fußzeilenplatzhalter 26">
+            <a:extLst>
+              <a:ext uri="{FF2B5EF4-FFF2-40B4-BE49-F238E27FC236}">
+                <a16:creationId xmlns:a16="http://schemas.microsoft.com/office/drawing/2014/main" id="{3976722D-E43A-48F2-811E-4F12ED62840C}"/>
+              </a:ext>
+            </a:extLst>
+          </p:cNvPr>
+          <p:cNvSpPr>
+            <a:spLocks noGrp="1"/>
+          </p:cNvSpPr>
+          <p:nvPr>
+            <p:ph type="ftr" sz="quarter" idx="11"/>
+          </p:nvPr>
+        </p:nvSpPr>
+        <p:spPr/>
+        <p:txBody>
+          <a:bodyPr/>
+          <a:lstStyle/>
+          <a:p>
+            <a:r>
+              <a:rPr lang="de-DE" dirty="0"/>
+              <a:t>Mobile Interaction Design - WS 17/18</a:t>
+            </a:r>
+          </a:p>
+        </p:txBody>
+      </p:sp>
+      <p:sp>
+        <p:nvSpPr>
+          <p:cNvPr id="28" name="Foliennummernplatzhalter 27">
+            <a:extLst>
+              <a:ext uri="{FF2B5EF4-FFF2-40B4-BE49-F238E27FC236}">
+                <a16:creationId xmlns:a16="http://schemas.microsoft.com/office/drawing/2014/main" id="{4A07CAB0-8524-4600-A2A2-63EF77B6DF10}"/>
+              </a:ext>
+            </a:extLst>
+          </p:cNvPr>
+          <p:cNvSpPr>
+            <a:spLocks noGrp="1"/>
+          </p:cNvSpPr>
+          <p:nvPr>
+            <p:ph type="sldNum" sz="quarter" idx="12"/>
+          </p:nvPr>
+        </p:nvSpPr>
+        <p:spPr/>
+        <p:txBody>
+          <a:bodyPr/>
+          <a:lstStyle/>
+          <a:p>
+            <a:fld id="{6C6AE60A-B69C-4790-82F7-3882EDF23186}" type="slidenum">
+              <a:rPr lang="de-DE" smtClean="0"/>
+              <a:t>3</a:t>
+            </a:fld>
+            <a:endParaRPr lang="de-DE"/>
+          </a:p>
+        </p:txBody>
+      </p:sp>
+      <p:pic>
+        <p:nvPicPr>
+          <p:cNvPr id="19" name="Grafik 18">
+            <a:extLst>
+              <a:ext uri="{FF2B5EF4-FFF2-40B4-BE49-F238E27FC236}">
+                <a16:creationId xmlns:a16="http://schemas.microsoft.com/office/drawing/2014/main" id="{8395CF72-B838-4732-9BD8-BE1309AE3555}"/>
+              </a:ext>
+            </a:extLst>
+          </p:cNvPr>
+          <p:cNvPicPr>
+            <a:picLocks noChangeAspect="1"/>
+          </p:cNvPicPr>
+          <p:nvPr/>
+        </p:nvPicPr>
+        <p:blipFill>
+          <a:blip r:embed="rId2" cstate="print">
+            <a:extLst>
+              <a:ext uri="{28A0092B-C50C-407E-A947-70E740481C1C}">
+                <a14:useLocalDpi xmlns:a14="http://schemas.microsoft.com/office/drawing/2010/main" val="0"/>
+              </a:ext>
+            </a:extLst>
+          </a:blip>
+          <a:stretch>
+            <a:fillRect/>
+          </a:stretch>
+        </p:blipFill>
+        <p:spPr>
+          <a:xfrm>
+            <a:off x="107504" y="6026396"/>
+            <a:ext cx="2360315" cy="695080"/>
+          </a:xfrm>
+          <a:prstGeom prst="rect">
+            <a:avLst/>
+          </a:prstGeom>
+        </p:spPr>
+      </p:pic>
+      <p:sp>
+        <p:nvSpPr>
+          <p:cNvPr id="4" name="Inhaltsplatzhalter 3">
+            <a:extLst>
+              <a:ext uri="{FF2B5EF4-FFF2-40B4-BE49-F238E27FC236}">
+                <a16:creationId xmlns:a16="http://schemas.microsoft.com/office/drawing/2014/main" id="{8BDF04EC-34E3-4086-87DA-0491BD37874E}"/>
+              </a:ext>
+            </a:extLst>
+          </p:cNvPr>
+          <p:cNvSpPr>
+            <a:spLocks noGrp="1"/>
+          </p:cNvSpPr>
+          <p:nvPr>
+            <p:ph idx="1"/>
+          </p:nvPr>
+        </p:nvSpPr>
+        <p:spPr>
+          <a:xfrm>
+            <a:off x="539552" y="1343422"/>
+            <a:ext cx="7975798" cy="4752528"/>
+          </a:xfrm>
+        </p:spPr>
+        <p:txBody>
+          <a:bodyPr>
+            <a:normAutofit/>
+          </a:bodyPr>
+          <a:lstStyle/>
+          <a:p>
+            <a:r>
+              <a:rPr lang="de-DE" sz="2800" dirty="0"/>
+              <a:t>Erkundungsfreudige Fußgänger</a:t>
+            </a:r>
+          </a:p>
+          <a:p>
+            <a:endParaRPr lang="de-DE" sz="2800" dirty="0"/>
+          </a:p>
+          <a:p>
+            <a:r>
+              <a:rPr lang="de-DE" sz="2800" dirty="0"/>
+              <a:t>Urlaubs- und Geschäftsreisende an fremden Orten</a:t>
+            </a:r>
+          </a:p>
+          <a:p>
+            <a:pPr marL="0" indent="0">
+              <a:buNone/>
+            </a:pPr>
+            <a:endParaRPr lang="de-DE" sz="2800" dirty="0"/>
+          </a:p>
+          <a:p>
+            <a:r>
+              <a:rPr lang="de-DE" sz="2800" dirty="0"/>
+              <a:t>Unentgeltliches Sightseeing bevorzugt</a:t>
+            </a:r>
+          </a:p>
+          <a:p>
+            <a:endParaRPr lang="de-DE" sz="2800" dirty="0"/>
+          </a:p>
+          <a:p>
+            <a:r>
+              <a:rPr lang="de-DE" sz="2800" dirty="0"/>
+              <a:t>Besitz eines Android Smartphones </a:t>
+            </a:r>
+          </a:p>
+          <a:p>
+            <a:pPr marL="0" indent="0">
+              <a:buNone/>
+            </a:pPr>
+            <a:r>
+              <a:rPr lang="de-DE" sz="2800" dirty="0"/>
+              <a:t>  (</a:t>
+            </a:r>
+            <a:r>
+              <a:rPr lang="de-DE" sz="2800" i="1" dirty="0"/>
+              <a:t>optional</a:t>
+            </a:r>
+            <a:r>
+              <a:rPr lang="de-DE" sz="2800" dirty="0"/>
+              <a:t>: Smartwatch)</a:t>
+            </a:r>
+          </a:p>
+          <a:p>
+            <a:endParaRPr lang="de-DE" sz="2800" dirty="0"/>
+          </a:p>
+        </p:txBody>
+      </p:sp>
+      <p:pic>
+        <p:nvPicPr>
+          <p:cNvPr id="9" name="Inhaltsplatzhalter 16">
+            <a:extLst>
+              <a:ext uri="{FF2B5EF4-FFF2-40B4-BE49-F238E27FC236}">
+                <a16:creationId xmlns:a16="http://schemas.microsoft.com/office/drawing/2014/main" id="{388F0AE5-25B0-4978-83EC-63475B7B83C2}"/>
+              </a:ext>
+            </a:extLst>
+          </p:cNvPr>
+          <p:cNvPicPr>
+            <a:picLocks noChangeAspect="1"/>
+          </p:cNvPicPr>
+          <p:nvPr/>
+        </p:nvPicPr>
+        <p:blipFill>
+          <a:blip r:embed="rId3" cstate="print">
+            <a:extLst>
+              <a:ext uri="{28A0092B-C50C-407E-A947-70E740481C1C}">
+                <a14:useLocalDpi xmlns:a14="http://schemas.microsoft.com/office/drawing/2010/main" val="0"/>
+              </a:ext>
+            </a:extLst>
+          </a:blip>
+          <a:stretch>
+            <a:fillRect/>
+          </a:stretch>
+        </p:blipFill>
+        <p:spPr>
+          <a:xfrm>
+            <a:off x="6455916" y="247081"/>
+            <a:ext cx="2655916" cy="831273"/>
+          </a:xfrm>
+          <a:prstGeom prst="rect">
+            <a:avLst/>
+          </a:prstGeom>
+        </p:spPr>
+      </p:pic>
+      <p:pic>
+        <p:nvPicPr>
+          <p:cNvPr id="7" name="Grafik 6">
+            <a:extLst>
+              <a:ext uri="{FF2B5EF4-FFF2-40B4-BE49-F238E27FC236}">
+                <a16:creationId xmlns:a16="http://schemas.microsoft.com/office/drawing/2014/main" id="{12B86C18-F20C-4B68-ABF6-B3282929B02A}"/>
+              </a:ext>
+            </a:extLst>
+          </p:cNvPr>
+          <p:cNvPicPr>
+            <a:picLocks noChangeAspect="1"/>
+          </p:cNvPicPr>
+          <p:nvPr/>
+        </p:nvPicPr>
+        <p:blipFill>
+          <a:blip r:embed="rId4" cstate="print">
+            <a:extLst>
+              <a:ext uri="{28A0092B-C50C-407E-A947-70E740481C1C}">
+                <a14:useLocalDpi xmlns:a14="http://schemas.microsoft.com/office/drawing/2010/main" val="0"/>
+              </a:ext>
+            </a:extLst>
+          </a:blip>
+          <a:stretch>
+            <a:fillRect/>
+          </a:stretch>
+        </p:blipFill>
+        <p:spPr>
+          <a:xfrm>
+            <a:off x="5796136" y="4221088"/>
+            <a:ext cx="360040" cy="360040"/>
+          </a:xfrm>
+          <a:prstGeom prst="rect">
+            <a:avLst/>
+          </a:prstGeom>
+        </p:spPr>
+      </p:pic>
+    </p:spTree>
+    <p:extLst>
+      <p:ext uri="{BB962C8B-B14F-4D97-AF65-F5344CB8AC3E}">
+        <p14:creationId xmlns:p14="http://schemas.microsoft.com/office/powerpoint/2010/main" val="3198014047"/>
+      </p:ext>
+    </p:extLst>
+  </p:cSld>
+  <p:clrMapOvr>
+    <a:masterClrMapping/>
+  </p:clrMapOvr>
+</p:sld>
+</file>
+
+<file path=ppt/slides/slide4.xml><?xml version="1.0" encoding="utf-8"?>
+<p:sld xmlns:a="http://schemas.openxmlformats.org/drawingml/2006/main" xmlns:r="http://schemas.openxmlformats.org/officeDocument/2006/relationships" xmlns:p="http://schemas.openxmlformats.org/presentationml/2006/main">
+  <p:cSld>
+    <p:spTree>
+      <p:nvGrpSpPr>
+        <p:cNvPr id="1" name=""/>
+        <p:cNvGrpSpPr/>
+        <p:nvPr/>
+      </p:nvGrpSpPr>
+      <p:grpSpPr>
+        <a:xfrm>
+          <a:off x="0" y="0"/>
+          <a:ext cx="0" cy="0"/>
+          <a:chOff x="0" y="0"/>
+          <a:chExt cx="0" cy="0"/>
+        </a:xfrm>
+      </p:grpSpPr>
+      <p:sp>
+        <p:nvSpPr>
+          <p:cNvPr id="2" name="Titel 1">
+            <a:extLst>
+              <a:ext uri="{FF2B5EF4-FFF2-40B4-BE49-F238E27FC236}">
+                <a16:creationId xmlns:a16="http://schemas.microsoft.com/office/drawing/2014/main" id="{4AC2AF5F-D4DB-4BFF-8690-FA5AEF7E6294}"/>
+              </a:ext>
+            </a:extLst>
+          </p:cNvPr>
+          <p:cNvSpPr>
+            <a:spLocks noGrp="1"/>
+          </p:cNvSpPr>
+          <p:nvPr>
+            <p:ph type="title"/>
+          </p:nvPr>
+        </p:nvSpPr>
+        <p:spPr>
+          <a:xfrm>
+            <a:off x="539552" y="231551"/>
+            <a:ext cx="5916364" cy="862335"/>
+          </a:xfrm>
+        </p:spPr>
+        <p:txBody>
+          <a:bodyPr>
+            <a:normAutofit/>
+          </a:bodyPr>
+          <a:lstStyle/>
+          <a:p>
+            <a:r>
+              <a:rPr lang="de-DE" sz="3600" dirty="0"/>
+              <a:t>Besonderheiten I</a:t>
+            </a:r>
+          </a:p>
+        </p:txBody>
+      </p:sp>
+      <p:sp>
+        <p:nvSpPr>
+          <p:cNvPr id="27" name="Fußzeilenplatzhalter 26">
+            <a:extLst>
+              <a:ext uri="{FF2B5EF4-FFF2-40B4-BE49-F238E27FC236}">
+                <a16:creationId xmlns:a16="http://schemas.microsoft.com/office/drawing/2014/main" id="{3976722D-E43A-48F2-811E-4F12ED62840C}"/>
+              </a:ext>
+            </a:extLst>
+          </p:cNvPr>
+          <p:cNvSpPr>
+            <a:spLocks noGrp="1"/>
+          </p:cNvSpPr>
+          <p:nvPr>
+            <p:ph type="ftr" sz="quarter" idx="11"/>
+          </p:nvPr>
+        </p:nvSpPr>
+        <p:spPr/>
+        <p:txBody>
+          <a:bodyPr/>
+          <a:lstStyle/>
+          <a:p>
+            <a:r>
+              <a:rPr lang="de-DE" dirty="0"/>
+              <a:t>Mobile Interaction Design - WS 17/18</a:t>
+            </a:r>
+          </a:p>
+        </p:txBody>
+      </p:sp>
+      <p:sp>
+        <p:nvSpPr>
+          <p:cNvPr id="28" name="Foliennummernplatzhalter 27">
+            <a:extLst>
+              <a:ext uri="{FF2B5EF4-FFF2-40B4-BE49-F238E27FC236}">
+                <a16:creationId xmlns:a16="http://schemas.microsoft.com/office/drawing/2014/main" id="{4A07CAB0-8524-4600-A2A2-63EF77B6DF10}"/>
+              </a:ext>
+            </a:extLst>
+          </p:cNvPr>
+          <p:cNvSpPr>
+            <a:spLocks noGrp="1"/>
+          </p:cNvSpPr>
+          <p:nvPr>
+            <p:ph type="sldNum" sz="quarter" idx="12"/>
+          </p:nvPr>
+        </p:nvSpPr>
+        <p:spPr/>
+        <p:txBody>
+          <a:bodyPr/>
+          <a:lstStyle/>
+          <a:p>
+            <a:fld id="{6C6AE60A-B69C-4790-82F7-3882EDF23186}" type="slidenum">
+              <a:rPr lang="de-DE" smtClean="0"/>
+              <a:t>4</a:t>
+            </a:fld>
+            <a:endParaRPr lang="de-DE"/>
+          </a:p>
+        </p:txBody>
+      </p:sp>
+      <p:pic>
+        <p:nvPicPr>
+          <p:cNvPr id="19" name="Grafik 18">
+            <a:extLst>
+              <a:ext uri="{FF2B5EF4-FFF2-40B4-BE49-F238E27FC236}">
+                <a16:creationId xmlns:a16="http://schemas.microsoft.com/office/drawing/2014/main" id="{8395CF72-B838-4732-9BD8-BE1309AE3555}"/>
+              </a:ext>
+            </a:extLst>
+          </p:cNvPr>
+          <p:cNvPicPr>
+            <a:picLocks noChangeAspect="1"/>
+          </p:cNvPicPr>
+          <p:nvPr/>
+        </p:nvPicPr>
+        <p:blipFill>
+          <a:blip r:embed="rId2" cstate="print">
+            <a:extLst>
+              <a:ext uri="{28A0092B-C50C-407E-A947-70E740481C1C}">
+                <a14:useLocalDpi xmlns:a14="http://schemas.microsoft.com/office/drawing/2010/main" val="0"/>
+              </a:ext>
+            </a:extLst>
+          </a:blip>
+          <a:stretch>
+            <a:fillRect/>
+          </a:stretch>
+        </p:blipFill>
+        <p:spPr>
+          <a:xfrm>
+            <a:off x="107504" y="6026396"/>
+            <a:ext cx="2360315" cy="695080"/>
+          </a:xfrm>
+          <a:prstGeom prst="rect">
+            <a:avLst/>
+          </a:prstGeom>
+        </p:spPr>
+      </p:pic>
+      <p:sp>
+        <p:nvSpPr>
+          <p:cNvPr id="4" name="Inhaltsplatzhalter 3">
+            <a:extLst>
+              <a:ext uri="{FF2B5EF4-FFF2-40B4-BE49-F238E27FC236}">
+                <a16:creationId xmlns:a16="http://schemas.microsoft.com/office/drawing/2014/main" id="{8BDF04EC-34E3-4086-87DA-0491BD37874E}"/>
+              </a:ext>
+            </a:extLst>
+          </p:cNvPr>
+          <p:cNvSpPr>
+            <a:spLocks noGrp="1"/>
+          </p:cNvSpPr>
+          <p:nvPr>
+            <p:ph idx="1"/>
+          </p:nvPr>
+        </p:nvSpPr>
+        <p:spPr>
+          <a:xfrm>
+            <a:off x="539552" y="1343422"/>
+            <a:ext cx="7975798" cy="4752528"/>
+          </a:xfrm>
+        </p:spPr>
+        <p:txBody>
+          <a:bodyPr>
+            <a:normAutofit/>
+          </a:bodyPr>
+          <a:lstStyle/>
+          <a:p>
+            <a:r>
+              <a:rPr lang="de-DE" sz="2800" dirty="0"/>
+              <a:t>Routengenerierung nach eigenen Wünschen</a:t>
+            </a:r>
+          </a:p>
+          <a:p>
+            <a:r>
+              <a:rPr lang="de-DE" sz="2800" dirty="0"/>
+              <a:t>Sehenswürdigkeiten-Auswahl sowohl über Bilder aus auch Standorten</a:t>
+            </a:r>
+          </a:p>
+        </p:txBody>
+      </p:sp>
+      <p:pic>
+        <p:nvPicPr>
+          <p:cNvPr id="9" name="Inhaltsplatzhalter 16">
+            <a:extLst>
+              <a:ext uri="{FF2B5EF4-FFF2-40B4-BE49-F238E27FC236}">
+                <a16:creationId xmlns:a16="http://schemas.microsoft.com/office/drawing/2014/main" id="{388F0AE5-25B0-4978-83EC-63475B7B83C2}"/>
+              </a:ext>
+            </a:extLst>
+          </p:cNvPr>
+          <p:cNvPicPr>
+            <a:picLocks noChangeAspect="1"/>
+          </p:cNvPicPr>
+          <p:nvPr/>
+        </p:nvPicPr>
+        <p:blipFill>
+          <a:blip r:embed="rId3" cstate="print">
+            <a:extLst>
+              <a:ext uri="{28A0092B-C50C-407E-A947-70E740481C1C}">
+                <a14:useLocalDpi xmlns:a14="http://schemas.microsoft.com/office/drawing/2010/main" val="0"/>
+              </a:ext>
+            </a:extLst>
+          </a:blip>
+          <a:stretch>
+            <a:fillRect/>
+          </a:stretch>
+        </p:blipFill>
+        <p:spPr>
+          <a:xfrm>
+            <a:off x="6455916" y="247081"/>
+            <a:ext cx="2655916" cy="831273"/>
+          </a:xfrm>
+          <a:prstGeom prst="rect">
+            <a:avLst/>
+          </a:prstGeom>
+        </p:spPr>
+      </p:pic>
+      <p:pic>
+        <p:nvPicPr>
+          <p:cNvPr id="6" name="Grafik 5">
+            <a:extLst>
+              <a:ext uri="{FF2B5EF4-FFF2-40B4-BE49-F238E27FC236}">
+                <a16:creationId xmlns:a16="http://schemas.microsoft.com/office/drawing/2014/main" id="{CE4CED0D-8344-420F-85B0-5EE54059554A}"/>
+              </a:ext>
+            </a:extLst>
+          </p:cNvPr>
+          <p:cNvPicPr>
+            <a:picLocks noChangeAspect="1"/>
+          </p:cNvPicPr>
+          <p:nvPr/>
+        </p:nvPicPr>
+        <p:blipFill>
+          <a:blip r:embed="rId4"/>
+          <a:stretch>
+            <a:fillRect/>
+          </a:stretch>
+        </p:blipFill>
+        <p:spPr>
+          <a:xfrm>
+            <a:off x="799418" y="2822628"/>
+            <a:ext cx="7805030" cy="2954232"/>
+          </a:xfrm>
+          <a:prstGeom prst="rect">
+            <a:avLst/>
+          </a:prstGeom>
+        </p:spPr>
+      </p:pic>
+    </p:spTree>
+    <p:extLst>
+      <p:ext uri="{BB962C8B-B14F-4D97-AF65-F5344CB8AC3E}">
+        <p14:creationId xmlns:p14="http://schemas.microsoft.com/office/powerpoint/2010/main" val="2250838325"/>
+      </p:ext>
+    </p:extLst>
+  </p:cSld>
+  <p:clrMapOvr>
+    <a:masterClrMapping/>
+  </p:clrMapOvr>
+</p:sld>
+</file>
+
+<file path=ppt/slides/slide5.xml><?xml version="1.0" encoding="utf-8"?>
+<p:sld xmlns:a="http://schemas.openxmlformats.org/drawingml/2006/main" xmlns:r="http://schemas.openxmlformats.org/officeDocument/2006/relationships" xmlns:p="http://schemas.openxmlformats.org/presentationml/2006/main">
+  <p:cSld>
+    <p:spTree>
+      <p:nvGrpSpPr>
+        <p:cNvPr id="1" name=""/>
+        <p:cNvGrpSpPr/>
+        <p:nvPr/>
+      </p:nvGrpSpPr>
+      <p:grpSpPr>
+        <a:xfrm>
+          <a:off x="0" y="0"/>
+          <a:ext cx="0" cy="0"/>
+          <a:chOff x="0" y="0"/>
+          <a:chExt cx="0" cy="0"/>
+        </a:xfrm>
+      </p:grpSpPr>
+      <p:sp>
+        <p:nvSpPr>
+          <p:cNvPr id="2" name="Titel 1">
+            <a:extLst>
+              <a:ext uri="{FF2B5EF4-FFF2-40B4-BE49-F238E27FC236}">
+                <a16:creationId xmlns:a16="http://schemas.microsoft.com/office/drawing/2014/main" id="{4AC2AF5F-D4DB-4BFF-8690-FA5AEF7E6294}"/>
+              </a:ext>
+            </a:extLst>
+          </p:cNvPr>
+          <p:cNvSpPr>
+            <a:spLocks noGrp="1"/>
+          </p:cNvSpPr>
+          <p:nvPr>
+            <p:ph type="title"/>
+          </p:nvPr>
+        </p:nvSpPr>
+        <p:spPr>
+          <a:xfrm>
+            <a:off x="539552" y="231551"/>
+            <a:ext cx="5916364" cy="862335"/>
+          </a:xfrm>
+        </p:spPr>
+        <p:txBody>
+          <a:bodyPr>
+            <a:normAutofit/>
+          </a:bodyPr>
+          <a:lstStyle/>
+          <a:p>
+            <a:r>
+              <a:rPr lang="de-DE" sz="3600" dirty="0"/>
+              <a:t>Besonderheiten II</a:t>
+            </a:r>
+          </a:p>
+        </p:txBody>
+      </p:sp>
+      <p:sp>
+        <p:nvSpPr>
+          <p:cNvPr id="27" name="Fußzeilenplatzhalter 26">
+            <a:extLst>
+              <a:ext uri="{FF2B5EF4-FFF2-40B4-BE49-F238E27FC236}">
+                <a16:creationId xmlns:a16="http://schemas.microsoft.com/office/drawing/2014/main" id="{3976722D-E43A-48F2-811E-4F12ED62840C}"/>
+              </a:ext>
+            </a:extLst>
+          </p:cNvPr>
+          <p:cNvSpPr>
+            <a:spLocks noGrp="1"/>
+          </p:cNvSpPr>
+          <p:nvPr>
+            <p:ph type="ftr" sz="quarter" idx="11"/>
+          </p:nvPr>
+        </p:nvSpPr>
+        <p:spPr/>
+        <p:txBody>
+          <a:bodyPr/>
+          <a:lstStyle/>
+          <a:p>
+            <a:r>
+              <a:rPr lang="de-DE" dirty="0"/>
+              <a:t>Mobile Interaction Design - WS 17/18</a:t>
+            </a:r>
+          </a:p>
+        </p:txBody>
+      </p:sp>
+      <p:sp>
+        <p:nvSpPr>
+          <p:cNvPr id="28" name="Foliennummernplatzhalter 27">
+            <a:extLst>
+              <a:ext uri="{FF2B5EF4-FFF2-40B4-BE49-F238E27FC236}">
+                <a16:creationId xmlns:a16="http://schemas.microsoft.com/office/drawing/2014/main" id="{4A07CAB0-8524-4600-A2A2-63EF77B6DF10}"/>
+              </a:ext>
+            </a:extLst>
+          </p:cNvPr>
+          <p:cNvSpPr>
+            <a:spLocks noGrp="1"/>
+          </p:cNvSpPr>
+          <p:nvPr>
+            <p:ph type="sldNum" sz="quarter" idx="12"/>
+          </p:nvPr>
+        </p:nvSpPr>
+        <p:spPr/>
+        <p:txBody>
+          <a:bodyPr/>
+          <a:lstStyle/>
+          <a:p>
+            <a:fld id="{6C6AE60A-B69C-4790-82F7-3882EDF23186}" type="slidenum">
+              <a:rPr lang="de-DE" smtClean="0"/>
+              <a:t>5</a:t>
+            </a:fld>
+            <a:endParaRPr lang="de-DE"/>
+          </a:p>
+        </p:txBody>
+      </p:sp>
+      <p:pic>
+        <p:nvPicPr>
+          <p:cNvPr id="19" name="Grafik 18">
+            <a:extLst>
+              <a:ext uri="{FF2B5EF4-FFF2-40B4-BE49-F238E27FC236}">
+                <a16:creationId xmlns:a16="http://schemas.microsoft.com/office/drawing/2014/main" id="{8395CF72-B838-4732-9BD8-BE1309AE3555}"/>
+              </a:ext>
+            </a:extLst>
+          </p:cNvPr>
+          <p:cNvPicPr>
+            <a:picLocks noChangeAspect="1"/>
+          </p:cNvPicPr>
+          <p:nvPr/>
+        </p:nvPicPr>
+        <p:blipFill>
+          <a:blip r:embed="rId2" cstate="print">
+            <a:extLst>
+              <a:ext uri="{28A0092B-C50C-407E-A947-70E740481C1C}">
+                <a14:useLocalDpi xmlns:a14="http://schemas.microsoft.com/office/drawing/2010/main" val="0"/>
+              </a:ext>
+            </a:extLst>
+          </a:blip>
+          <a:stretch>
+            <a:fillRect/>
+          </a:stretch>
+        </p:blipFill>
+        <p:spPr>
+          <a:xfrm>
+            <a:off x="107504" y="6026396"/>
+            <a:ext cx="2360315" cy="695080"/>
+          </a:xfrm>
+          <a:prstGeom prst="rect">
+            <a:avLst/>
+          </a:prstGeom>
+        </p:spPr>
+      </p:pic>
+      <p:sp>
+        <p:nvSpPr>
+          <p:cNvPr id="4" name="Inhaltsplatzhalter 3">
+            <a:extLst>
+              <a:ext uri="{FF2B5EF4-FFF2-40B4-BE49-F238E27FC236}">
+                <a16:creationId xmlns:a16="http://schemas.microsoft.com/office/drawing/2014/main" id="{8BDF04EC-34E3-4086-87DA-0491BD37874E}"/>
+              </a:ext>
+            </a:extLst>
+          </p:cNvPr>
+          <p:cNvSpPr>
+            <a:spLocks noGrp="1"/>
+          </p:cNvSpPr>
+          <p:nvPr>
+            <p:ph idx="1"/>
+          </p:nvPr>
+        </p:nvSpPr>
+        <p:spPr>
+          <a:xfrm>
+            <a:off x="539552" y="1343422"/>
+            <a:ext cx="7975798" cy="4752528"/>
+          </a:xfrm>
+        </p:spPr>
+        <p:txBody>
+          <a:bodyPr>
+            <a:normAutofit/>
+          </a:bodyPr>
+          <a:lstStyle/>
+          <a:p>
+            <a:r>
+              <a:rPr lang="de-DE" sz="2800" dirty="0"/>
+              <a:t>Navigation und Infos über Smartwatch</a:t>
+            </a:r>
+          </a:p>
+          <a:p>
+            <a:pPr marL="0" indent="0">
+              <a:buNone/>
+            </a:pPr>
+            <a:r>
+              <a:rPr lang="de-DE" sz="2800" dirty="0"/>
+              <a:t>	</a:t>
+            </a:r>
+            <a:r>
+              <a:rPr lang="de-DE" sz="2800" dirty="0">
+                <a:sym typeface="Symbol" panose="05050102010706020507" pitchFamily="18" charset="2"/>
+              </a:rPr>
+              <a:t> Smartphone kann in der Tasche bleiben</a:t>
+            </a:r>
+            <a:endParaRPr lang="de-DE" sz="2800" dirty="0"/>
+          </a:p>
+        </p:txBody>
+      </p:sp>
+      <p:pic>
+        <p:nvPicPr>
+          <p:cNvPr id="9" name="Inhaltsplatzhalter 16">
+            <a:extLst>
+              <a:ext uri="{FF2B5EF4-FFF2-40B4-BE49-F238E27FC236}">
+                <a16:creationId xmlns:a16="http://schemas.microsoft.com/office/drawing/2014/main" id="{388F0AE5-25B0-4978-83EC-63475B7B83C2}"/>
+              </a:ext>
+            </a:extLst>
+          </p:cNvPr>
+          <p:cNvPicPr>
+            <a:picLocks noChangeAspect="1"/>
+          </p:cNvPicPr>
+          <p:nvPr/>
+        </p:nvPicPr>
+        <p:blipFill>
+          <a:blip r:embed="rId3" cstate="print">
+            <a:extLst>
+              <a:ext uri="{28A0092B-C50C-407E-A947-70E740481C1C}">
+                <a14:useLocalDpi xmlns:a14="http://schemas.microsoft.com/office/drawing/2010/main" val="0"/>
+              </a:ext>
+            </a:extLst>
+          </a:blip>
+          <a:stretch>
+            <a:fillRect/>
+          </a:stretch>
+        </p:blipFill>
+        <p:spPr>
+          <a:xfrm>
+            <a:off x="6455916" y="247081"/>
+            <a:ext cx="2655916" cy="831273"/>
+          </a:xfrm>
+          <a:prstGeom prst="rect">
+            <a:avLst/>
+          </a:prstGeom>
+        </p:spPr>
+      </p:pic>
+      <p:pic>
+        <p:nvPicPr>
+          <p:cNvPr id="6" name="Grafik 5">
+            <a:extLst>
+              <a:ext uri="{FF2B5EF4-FFF2-40B4-BE49-F238E27FC236}">
+                <a16:creationId xmlns:a16="http://schemas.microsoft.com/office/drawing/2014/main" id="{1B56F0D0-E170-4213-A2BF-231C13A1E6E7}"/>
+              </a:ext>
+            </a:extLst>
+          </p:cNvPr>
+          <p:cNvPicPr>
+            <a:picLocks noChangeAspect="1"/>
+          </p:cNvPicPr>
+          <p:nvPr/>
+        </p:nvPicPr>
+        <p:blipFill>
+          <a:blip r:embed="rId4" cstate="print">
+            <a:extLst>
+              <a:ext uri="{28A0092B-C50C-407E-A947-70E740481C1C}">
+                <a14:useLocalDpi xmlns:a14="http://schemas.microsoft.com/office/drawing/2010/main" val="0"/>
+              </a:ext>
+            </a:extLst>
+          </a:blip>
+          <a:stretch>
+            <a:fillRect/>
+          </a:stretch>
+        </p:blipFill>
+        <p:spPr>
+          <a:xfrm>
+            <a:off x="1115616" y="2870795"/>
+            <a:ext cx="1670172" cy="2348880"/>
+          </a:xfrm>
+          <a:prstGeom prst="rect">
+            <a:avLst/>
+          </a:prstGeom>
+        </p:spPr>
+      </p:pic>
+      <p:pic>
+        <p:nvPicPr>
+          <p:cNvPr id="8" name="Grafik 7">
+            <a:extLst>
+              <a:ext uri="{FF2B5EF4-FFF2-40B4-BE49-F238E27FC236}">
+                <a16:creationId xmlns:a16="http://schemas.microsoft.com/office/drawing/2014/main" id="{3FF29469-1E80-4497-931F-0230DC594722}"/>
+              </a:ext>
+            </a:extLst>
+          </p:cNvPr>
+          <p:cNvPicPr>
+            <a:picLocks noChangeAspect="1"/>
+          </p:cNvPicPr>
+          <p:nvPr/>
+        </p:nvPicPr>
+        <p:blipFill>
+          <a:blip r:embed="rId5" cstate="print">
+            <a:extLst>
+              <a:ext uri="{28A0092B-C50C-407E-A947-70E740481C1C}">
+                <a14:useLocalDpi xmlns:a14="http://schemas.microsoft.com/office/drawing/2010/main" val="0"/>
+              </a:ext>
+            </a:extLst>
+          </a:blip>
+          <a:stretch>
+            <a:fillRect/>
+          </a:stretch>
+        </p:blipFill>
+        <p:spPr>
+          <a:xfrm>
+            <a:off x="6267572" y="2853283"/>
+            <a:ext cx="1760812" cy="2370287"/>
+          </a:xfrm>
+          <a:prstGeom prst="rect">
+            <a:avLst/>
+          </a:prstGeom>
+        </p:spPr>
+      </p:pic>
+      <p:pic>
+        <p:nvPicPr>
+          <p:cNvPr id="11" name="Grafik 10">
+            <a:extLst>
+              <a:ext uri="{FF2B5EF4-FFF2-40B4-BE49-F238E27FC236}">
+                <a16:creationId xmlns:a16="http://schemas.microsoft.com/office/drawing/2014/main" id="{82EB1ABC-712F-44C5-8248-5E92FDE02931}"/>
+              </a:ext>
+            </a:extLst>
+          </p:cNvPr>
+          <p:cNvPicPr>
+            <a:picLocks noChangeAspect="1"/>
+          </p:cNvPicPr>
+          <p:nvPr/>
+        </p:nvPicPr>
+        <p:blipFill>
+          <a:blip r:embed="rId6" cstate="print">
+            <a:extLst>
+              <a:ext uri="{28A0092B-C50C-407E-A947-70E740481C1C}">
+                <a14:useLocalDpi xmlns:a14="http://schemas.microsoft.com/office/drawing/2010/main" val="0"/>
+              </a:ext>
+            </a:extLst>
+          </a:blip>
+          <a:stretch>
+            <a:fillRect/>
+          </a:stretch>
+        </p:blipFill>
+        <p:spPr>
+          <a:xfrm>
+            <a:off x="3779912" y="2853283"/>
+            <a:ext cx="1572205" cy="2404927"/>
+          </a:xfrm>
+          <a:prstGeom prst="rect">
+            <a:avLst/>
+          </a:prstGeom>
+        </p:spPr>
+      </p:pic>
+    </p:spTree>
+    <p:extLst>
+      <p:ext uri="{BB962C8B-B14F-4D97-AF65-F5344CB8AC3E}">
+        <p14:creationId xmlns:p14="http://schemas.microsoft.com/office/powerpoint/2010/main" val="763954935"/>
+      </p:ext>
+    </p:extLst>
+  </p:cSld>
+  <p:clrMapOvr>
+    <a:masterClrMapping/>
+  </p:clrMapOvr>
+</p:sld>
+</file>
+
+<file path=ppt/slides/slide6.xml><?xml version="1.0" encoding="utf-8"?>
+<p:sld xmlns:a="http://schemas.openxmlformats.org/drawingml/2006/main" xmlns:r="http://schemas.openxmlformats.org/officeDocument/2006/relationships" xmlns:p="http://schemas.openxmlformats.org/presentationml/2006/main">
+  <p:cSld>
+    <p:bg>
+      <p:bgPr>
+        <a:gradFill>
+          <a:gsLst>
+            <a:gs pos="0">
+              <a:schemeClr val="accent1">
+                <a:lumMod val="5000"/>
+                <a:lumOff val="95000"/>
+              </a:schemeClr>
+            </a:gs>
+            <a:gs pos="74000">
+              <a:schemeClr val="accent6">
+                <a:lumMod val="20000"/>
+                <a:lumOff val="80000"/>
+              </a:schemeClr>
+            </a:gs>
+            <a:gs pos="83000">
+              <a:schemeClr val="accent6">
+                <a:lumMod val="16000"/>
+                <a:lumOff val="84000"/>
+              </a:schemeClr>
+            </a:gs>
+            <a:gs pos="100000">
+              <a:schemeClr val="accent6">
+                <a:lumMod val="16000"/>
+                <a:lumOff val="84000"/>
+              </a:schemeClr>
+            </a:gs>
+          </a:gsLst>
+          <a:lin ang="5400000" scaled="1"/>
+        </a:gradFill>
+        <a:effectLst/>
+      </p:bgPr>
+    </p:bg>
+    <p:spTree>
+      <p:nvGrpSpPr>
+        <p:cNvPr id="1" name=""/>
+        <p:cNvGrpSpPr/>
+        <p:nvPr/>
+      </p:nvGrpSpPr>
+      <p:grpSpPr>
+        <a:xfrm>
+          <a:off x="0" y="0"/>
+          <a:ext cx="0" cy="0"/>
+          <a:chOff x="0" y="0"/>
+          <a:chExt cx="0" cy="0"/>
+        </a:xfrm>
+      </p:grpSpPr>
+      <p:sp>
+        <p:nvSpPr>
+          <p:cNvPr id="5" name="Titel 4">
+            <a:extLst>
+              <a:ext uri="{FF2B5EF4-FFF2-40B4-BE49-F238E27FC236}">
+                <a16:creationId xmlns:a16="http://schemas.microsoft.com/office/drawing/2014/main" id="{C603017D-41B6-4EAD-8644-94DC7BE96C3D}"/>
+              </a:ext>
+            </a:extLst>
+          </p:cNvPr>
+          <p:cNvSpPr>
+            <a:spLocks noGrp="1"/>
+          </p:cNvSpPr>
+          <p:nvPr>
+            <p:ph type="title"/>
+          </p:nvPr>
+        </p:nvSpPr>
+        <p:spPr>
+          <a:xfrm>
+            <a:off x="628650" y="2766218"/>
+            <a:ext cx="7886700" cy="1325563"/>
+          </a:xfrm>
+        </p:spPr>
+        <p:txBody>
+          <a:bodyPr>
+            <a:normAutofit/>
+          </a:bodyPr>
+          <a:lstStyle/>
+          <a:p>
+            <a:pPr algn="ctr"/>
+            <a:r>
+              <a:rPr lang="de-DE" sz="4400" dirty="0"/>
+              <a:t>Live Demo</a:t>
+            </a:r>
+          </a:p>
+        </p:txBody>
+      </p:sp>
+    </p:spTree>
+    <p:extLst>
+      <p:ext uri="{BB962C8B-B14F-4D97-AF65-F5344CB8AC3E}">
+        <p14:creationId xmlns:p14="http://schemas.microsoft.com/office/powerpoint/2010/main" val="1334565046"/>
+      </p:ext>
+    </p:extLst>
+  </p:cSld>
+  <p:clrMapOvr>
+    <a:masterClrMapping/>
+  </p:clrMapOvr>
+</p:sld>
+</file>
+
+<file path=ppt/slides/slide7.xml><?xml version="1.0" encoding="utf-8"?>
+<p:sld xmlns:a="http://schemas.openxmlformats.org/drawingml/2006/main" xmlns:r="http://schemas.openxmlformats.org/officeDocument/2006/relationships" xmlns:p="http://schemas.openxmlformats.org/presentationml/2006/main">
+  <p:cSld>
+    <p:spTree>
+      <p:nvGrpSpPr>
+        <p:cNvPr id="1" name=""/>
+        <p:cNvGrpSpPr/>
+        <p:nvPr/>
+      </p:nvGrpSpPr>
+      <p:grpSpPr>
+        <a:xfrm>
+          <a:off x="0" y="0"/>
+          <a:ext cx="0" cy="0"/>
+          <a:chOff x="0" y="0"/>
+          <a:chExt cx="0" cy="0"/>
+        </a:xfrm>
+      </p:grpSpPr>
+      <p:sp>
+        <p:nvSpPr>
+          <p:cNvPr id="2" name="Titel 1">
+            <a:extLst>
+              <a:ext uri="{FF2B5EF4-FFF2-40B4-BE49-F238E27FC236}">
+                <a16:creationId xmlns:a16="http://schemas.microsoft.com/office/drawing/2014/main" id="{4AC2AF5F-D4DB-4BFF-8690-FA5AEF7E6294}"/>
+              </a:ext>
+            </a:extLst>
+          </p:cNvPr>
+          <p:cNvSpPr>
+            <a:spLocks noGrp="1"/>
+          </p:cNvSpPr>
+          <p:nvPr>
+            <p:ph type="title"/>
+          </p:nvPr>
+        </p:nvSpPr>
+        <p:spPr>
+          <a:xfrm>
+            <a:off x="539552" y="231551"/>
+            <a:ext cx="5916364" cy="862335"/>
+          </a:xfrm>
+        </p:spPr>
+        <p:txBody>
+          <a:bodyPr>
+            <a:normAutofit/>
+          </a:bodyPr>
+          <a:lstStyle/>
+          <a:p>
+            <a:endParaRPr lang="de-DE" sz="3600" dirty="0"/>
+          </a:p>
+        </p:txBody>
+      </p:sp>
+      <p:sp>
+        <p:nvSpPr>
+          <p:cNvPr id="27" name="Fußzeilenplatzhalter 26">
+            <a:extLst>
+              <a:ext uri="{FF2B5EF4-FFF2-40B4-BE49-F238E27FC236}">
+                <a16:creationId xmlns:a16="http://schemas.microsoft.com/office/drawing/2014/main" id="{3976722D-E43A-48F2-811E-4F12ED62840C}"/>
+              </a:ext>
+            </a:extLst>
+          </p:cNvPr>
+          <p:cNvSpPr>
+            <a:spLocks noGrp="1"/>
+          </p:cNvSpPr>
+          <p:nvPr>
+            <p:ph type="ftr" sz="quarter" idx="11"/>
+          </p:nvPr>
+        </p:nvSpPr>
+        <p:spPr/>
+        <p:txBody>
+          <a:bodyPr/>
+          <a:lstStyle/>
+          <a:p>
+            <a:r>
+              <a:rPr lang="de-DE" dirty="0"/>
+              <a:t>Mobile Interaction Design - WS 17/18</a:t>
+            </a:r>
+          </a:p>
+        </p:txBody>
+      </p:sp>
+      <p:sp>
+        <p:nvSpPr>
+          <p:cNvPr id="28" name="Foliennummernplatzhalter 27">
+            <a:extLst>
+              <a:ext uri="{FF2B5EF4-FFF2-40B4-BE49-F238E27FC236}">
+                <a16:creationId xmlns:a16="http://schemas.microsoft.com/office/drawing/2014/main" id="{4A07CAB0-8524-4600-A2A2-63EF77B6DF10}"/>
+              </a:ext>
+            </a:extLst>
+          </p:cNvPr>
+          <p:cNvSpPr>
+            <a:spLocks noGrp="1"/>
+          </p:cNvSpPr>
+          <p:nvPr>
+            <p:ph type="sldNum" sz="quarter" idx="12"/>
+          </p:nvPr>
+        </p:nvSpPr>
+        <p:spPr/>
+        <p:txBody>
+          <a:bodyPr/>
+          <a:lstStyle/>
+          <a:p>
+            <a:fld id="{6C6AE60A-B69C-4790-82F7-3882EDF23186}" type="slidenum">
+              <a:rPr lang="de-DE" smtClean="0"/>
+              <a:t>7</a:t>
+            </a:fld>
+            <a:endParaRPr lang="de-DE"/>
+          </a:p>
+        </p:txBody>
+      </p:sp>
+      <p:pic>
+        <p:nvPicPr>
+          <p:cNvPr id="19" name="Grafik 18">
+            <a:extLst>
+              <a:ext uri="{FF2B5EF4-FFF2-40B4-BE49-F238E27FC236}">
+                <a16:creationId xmlns:a16="http://schemas.microsoft.com/office/drawing/2014/main" id="{8395CF72-B838-4732-9BD8-BE1309AE3555}"/>
+              </a:ext>
+            </a:extLst>
+          </p:cNvPr>
+          <p:cNvPicPr>
+            <a:picLocks noChangeAspect="1"/>
+          </p:cNvPicPr>
+          <p:nvPr/>
+        </p:nvPicPr>
+        <p:blipFill>
+          <a:blip r:embed="rId2" cstate="print">
+            <a:extLst>
+              <a:ext uri="{28A0092B-C50C-407E-A947-70E740481C1C}">
+                <a14:useLocalDpi xmlns:a14="http://schemas.microsoft.com/office/drawing/2010/main" val="0"/>
+              </a:ext>
+            </a:extLst>
+          </a:blip>
+          <a:stretch>
+            <a:fillRect/>
+          </a:stretch>
+        </p:blipFill>
+        <p:spPr>
+          <a:xfrm>
+            <a:off x="107504" y="6026396"/>
+            <a:ext cx="2360315" cy="695080"/>
+          </a:xfrm>
+          <a:prstGeom prst="rect">
+            <a:avLst/>
+          </a:prstGeom>
+        </p:spPr>
+      </p:pic>
+      <p:sp>
+        <p:nvSpPr>
+          <p:cNvPr id="4" name="Inhaltsplatzhalter 3">
+            <a:extLst>
+              <a:ext uri="{FF2B5EF4-FFF2-40B4-BE49-F238E27FC236}">
+                <a16:creationId xmlns:a16="http://schemas.microsoft.com/office/drawing/2014/main" id="{8BDF04EC-34E3-4086-87DA-0491BD37874E}"/>
+              </a:ext>
+            </a:extLst>
+          </p:cNvPr>
+          <p:cNvSpPr>
+            <a:spLocks noGrp="1"/>
+          </p:cNvSpPr>
+          <p:nvPr>
+            <p:ph idx="1"/>
+          </p:nvPr>
+        </p:nvSpPr>
+        <p:spPr>
+          <a:xfrm>
+            <a:off x="539552" y="1343422"/>
+            <a:ext cx="7975798" cy="4752528"/>
+          </a:xfrm>
+        </p:spPr>
+        <p:txBody>
+          <a:bodyPr>
+            <a:normAutofit/>
+          </a:bodyPr>
+          <a:lstStyle/>
+          <a:p>
+            <a:endParaRPr lang="de-DE" sz="2800" dirty="0"/>
+          </a:p>
+        </p:txBody>
+      </p:sp>
+      <p:pic>
+        <p:nvPicPr>
+          <p:cNvPr id="9" name="Inhaltsplatzhalter 16">
+            <a:extLst>
+              <a:ext uri="{FF2B5EF4-FFF2-40B4-BE49-F238E27FC236}">
+                <a16:creationId xmlns:a16="http://schemas.microsoft.com/office/drawing/2014/main" id="{388F0AE5-25B0-4978-83EC-63475B7B83C2}"/>
+              </a:ext>
+            </a:extLst>
+          </p:cNvPr>
+          <p:cNvPicPr>
+            <a:picLocks noChangeAspect="1"/>
+          </p:cNvPicPr>
+          <p:nvPr/>
+        </p:nvPicPr>
+        <p:blipFill>
+          <a:blip r:embed="rId3" cstate="print">
+            <a:extLst>
+              <a:ext uri="{28A0092B-C50C-407E-A947-70E740481C1C}">
+                <a14:useLocalDpi xmlns:a14="http://schemas.microsoft.com/office/drawing/2010/main" val="0"/>
+              </a:ext>
+            </a:extLst>
+          </a:blip>
+          <a:stretch>
+            <a:fillRect/>
+          </a:stretch>
+        </p:blipFill>
+        <p:spPr>
+          <a:xfrm>
+            <a:off x="6455916" y="247081"/>
+            <a:ext cx="2655916" cy="831273"/>
+          </a:xfrm>
+          <a:prstGeom prst="rect">
+            <a:avLst/>
+          </a:prstGeom>
+        </p:spPr>
+      </p:pic>
+    </p:spTree>
+    <p:extLst>
+      <p:ext uri="{BB962C8B-B14F-4D97-AF65-F5344CB8AC3E}">
+        <p14:creationId xmlns:p14="http://schemas.microsoft.com/office/powerpoint/2010/main" val="4078608833"/>
+      </p:ext>
+    </p:extLst>
+  </p:cSld>
+  <p:clrMapOvr>
+    <a:masterClrMapping/>
+  </p:clrMapOvr>
+</p:sld>
+</file>
+
+<file path=ppt/slides/slide8.xml><?xml version="1.0" encoding="utf-8"?>
+<p:sld xmlns:a="http://schemas.openxmlformats.org/drawingml/2006/main" xmlns:r="http://schemas.openxmlformats.org/officeDocument/2006/relationships" xmlns:p="http://schemas.openxmlformats.org/presentationml/2006/main">
+  <p:cSld>
+    <p:spTree>
+      <p:nvGrpSpPr>
+        <p:cNvPr id="1" name=""/>
+        <p:cNvGrpSpPr/>
+        <p:nvPr/>
+      </p:nvGrpSpPr>
+      <p:grpSpPr>
+        <a:xfrm>
+          <a:off x="0" y="0"/>
+          <a:ext cx="0" cy="0"/>
+          <a:chOff x="0" y="0"/>
+          <a:chExt cx="0" cy="0"/>
+        </a:xfrm>
+      </p:grpSpPr>
+      <p:sp>
+        <p:nvSpPr>
+          <p:cNvPr id="2" name="Titel 1">
+            <a:extLst>
+              <a:ext uri="{FF2B5EF4-FFF2-40B4-BE49-F238E27FC236}">
+                <a16:creationId xmlns:a16="http://schemas.microsoft.com/office/drawing/2014/main" id="{4AC2AF5F-D4DB-4BFF-8690-FA5AEF7E6294}"/>
+              </a:ext>
+            </a:extLst>
+          </p:cNvPr>
+          <p:cNvSpPr>
+            <a:spLocks noGrp="1"/>
+          </p:cNvSpPr>
+          <p:nvPr>
+            <p:ph type="title"/>
+          </p:nvPr>
+        </p:nvSpPr>
+        <p:spPr>
+          <a:xfrm>
+            <a:off x="539552" y="231551"/>
+            <a:ext cx="5916364" cy="862335"/>
+          </a:xfrm>
+        </p:spPr>
+        <p:txBody>
+          <a:bodyPr>
+            <a:normAutofit/>
+          </a:bodyPr>
+          <a:lstStyle/>
+          <a:p>
+            <a:endParaRPr lang="de-DE" sz="3600" dirty="0"/>
+          </a:p>
+        </p:txBody>
+      </p:sp>
+      <p:sp>
+        <p:nvSpPr>
+          <p:cNvPr id="27" name="Fußzeilenplatzhalter 26">
+            <a:extLst>
+              <a:ext uri="{FF2B5EF4-FFF2-40B4-BE49-F238E27FC236}">
+                <a16:creationId xmlns:a16="http://schemas.microsoft.com/office/drawing/2014/main" id="{3976722D-E43A-48F2-811E-4F12ED62840C}"/>
+              </a:ext>
+            </a:extLst>
+          </p:cNvPr>
+          <p:cNvSpPr>
+            <a:spLocks noGrp="1"/>
+          </p:cNvSpPr>
+          <p:nvPr>
+            <p:ph type="ftr" sz="quarter" idx="11"/>
+          </p:nvPr>
+        </p:nvSpPr>
+        <p:spPr/>
+        <p:txBody>
+          <a:bodyPr/>
+          <a:lstStyle/>
+          <a:p>
+            <a:r>
+              <a:rPr lang="de-DE" dirty="0"/>
+              <a:t>Mobile Interaction Design - WS 17/18</a:t>
+            </a:r>
+          </a:p>
+        </p:txBody>
+      </p:sp>
+      <p:sp>
+        <p:nvSpPr>
+          <p:cNvPr id="28" name="Foliennummernplatzhalter 27">
+            <a:extLst>
+              <a:ext uri="{FF2B5EF4-FFF2-40B4-BE49-F238E27FC236}">
+                <a16:creationId xmlns:a16="http://schemas.microsoft.com/office/drawing/2014/main" id="{4A07CAB0-8524-4600-A2A2-63EF77B6DF10}"/>
+              </a:ext>
+            </a:extLst>
+          </p:cNvPr>
+          <p:cNvSpPr>
+            <a:spLocks noGrp="1"/>
+          </p:cNvSpPr>
+          <p:nvPr>
+            <p:ph type="sldNum" sz="quarter" idx="12"/>
+          </p:nvPr>
+        </p:nvSpPr>
+        <p:spPr/>
+        <p:txBody>
+          <a:bodyPr/>
+          <a:lstStyle/>
+          <a:p>
+            <a:fld id="{6C6AE60A-B69C-4790-82F7-3882EDF23186}" type="slidenum">
+              <a:rPr lang="de-DE" smtClean="0"/>
+              <a:t>8</a:t>
+            </a:fld>
+            <a:endParaRPr lang="de-DE"/>
+          </a:p>
+        </p:txBody>
+      </p:sp>
+      <p:pic>
+        <p:nvPicPr>
+          <p:cNvPr id="19" name="Grafik 18">
+            <a:extLst>
+              <a:ext uri="{FF2B5EF4-FFF2-40B4-BE49-F238E27FC236}">
+                <a16:creationId xmlns:a16="http://schemas.microsoft.com/office/drawing/2014/main" id="{8395CF72-B838-4732-9BD8-BE1309AE3555}"/>
+              </a:ext>
+            </a:extLst>
+          </p:cNvPr>
+          <p:cNvPicPr>
+            <a:picLocks noChangeAspect="1"/>
+          </p:cNvPicPr>
+          <p:nvPr/>
+        </p:nvPicPr>
+        <p:blipFill>
+          <a:blip r:embed="rId2" cstate="print">
+            <a:extLst>
+              <a:ext uri="{28A0092B-C50C-407E-A947-70E740481C1C}">
+                <a14:useLocalDpi xmlns:a14="http://schemas.microsoft.com/office/drawing/2010/main" val="0"/>
+              </a:ext>
+            </a:extLst>
+          </a:blip>
+          <a:stretch>
+            <a:fillRect/>
+          </a:stretch>
+        </p:blipFill>
+        <p:spPr>
+          <a:xfrm>
+            <a:off x="107504" y="6026396"/>
+            <a:ext cx="2360315" cy="695080"/>
+          </a:xfrm>
+          <a:prstGeom prst="rect">
+            <a:avLst/>
+          </a:prstGeom>
+        </p:spPr>
+      </p:pic>
+      <p:sp>
+        <p:nvSpPr>
+          <p:cNvPr id="4" name="Inhaltsplatzhalter 3">
+            <a:extLst>
+              <a:ext uri="{FF2B5EF4-FFF2-40B4-BE49-F238E27FC236}">
+                <a16:creationId xmlns:a16="http://schemas.microsoft.com/office/drawing/2014/main" id="{8BDF04EC-34E3-4086-87DA-0491BD37874E}"/>
+              </a:ext>
+            </a:extLst>
+          </p:cNvPr>
+          <p:cNvSpPr>
+            <a:spLocks noGrp="1"/>
+          </p:cNvSpPr>
+          <p:nvPr>
+            <p:ph idx="1"/>
+          </p:nvPr>
+        </p:nvSpPr>
+        <p:spPr>
+          <a:xfrm>
+            <a:off x="539552" y="1343422"/>
+            <a:ext cx="7975798" cy="4752528"/>
+          </a:xfrm>
+        </p:spPr>
+        <p:txBody>
+          <a:bodyPr>
+            <a:normAutofit/>
+          </a:bodyPr>
+          <a:lstStyle/>
+          <a:p>
+            <a:endParaRPr lang="de-DE" sz="2800" dirty="0"/>
+          </a:p>
+        </p:txBody>
+      </p:sp>
+      <p:pic>
+        <p:nvPicPr>
+          <p:cNvPr id="9" name="Inhaltsplatzhalter 16">
+            <a:extLst>
+              <a:ext uri="{FF2B5EF4-FFF2-40B4-BE49-F238E27FC236}">
+                <a16:creationId xmlns:a16="http://schemas.microsoft.com/office/drawing/2014/main" id="{388F0AE5-25B0-4978-83EC-63475B7B83C2}"/>
+              </a:ext>
+            </a:extLst>
+          </p:cNvPr>
+          <p:cNvPicPr>
+            <a:picLocks noChangeAspect="1"/>
+          </p:cNvPicPr>
+          <p:nvPr/>
+        </p:nvPicPr>
+        <p:blipFill>
+          <a:blip r:embed="rId3" cstate="print">
+            <a:extLst>
+              <a:ext uri="{28A0092B-C50C-407E-A947-70E740481C1C}">
+                <a14:useLocalDpi xmlns:a14="http://schemas.microsoft.com/office/drawing/2010/main" val="0"/>
+              </a:ext>
+            </a:extLst>
+          </a:blip>
+          <a:stretch>
+            <a:fillRect/>
+          </a:stretch>
+        </p:blipFill>
+        <p:spPr>
+          <a:xfrm>
+            <a:off x="6455916" y="247081"/>
+            <a:ext cx="2655916" cy="831273"/>
+          </a:xfrm>
+          <a:prstGeom prst="rect">
+            <a:avLst/>
+          </a:prstGeom>
+        </p:spPr>
+      </p:pic>
+    </p:spTree>
+    <p:extLst>
+      <p:ext uri="{BB962C8B-B14F-4D97-AF65-F5344CB8AC3E}">
+        <p14:creationId xmlns:p14="http://schemas.microsoft.com/office/powerpoint/2010/main" val="54805638"/>
       </p:ext>
     </p:extLst>
   </p:cSld>

</xml_diff>